<commit_message>
created presence absence GBIF plot
</commit_message>
<xml_diff>
--- a/presentation/figures.pptx
+++ b/presentation/figures.pptx
@@ -12,6 +12,7 @@
     <p:sldId id="259" r:id="rId6"/>
     <p:sldId id="262" r:id="rId7"/>
     <p:sldId id="263" r:id="rId8"/>
+    <p:sldId id="264" r:id="rId9"/>
   </p:sldIdLst>
   <p:sldSz cx="12192000" cy="6858000"/>
   <p:notesSz cx="6858000" cy="9144000"/>
@@ -267,7 +268,7 @@
           <a:p>
             <a:fld id="{959034B2-E59A-43A2-8E80-CBA56A51A393}" type="datetimeFigureOut">
               <a:rPr lang="en-IE" smtClean="0"/>
-              <a:t>11/11/2025</a:t>
+              <a:t>13/11/2025</a:t>
             </a:fld>
             <a:endParaRPr lang="en-IE"/>
           </a:p>
@@ -467,7 +468,7 @@
           <a:p>
             <a:fld id="{959034B2-E59A-43A2-8E80-CBA56A51A393}" type="datetimeFigureOut">
               <a:rPr lang="en-IE" smtClean="0"/>
-              <a:t>11/11/2025</a:t>
+              <a:t>13/11/2025</a:t>
             </a:fld>
             <a:endParaRPr lang="en-IE"/>
           </a:p>
@@ -677,7 +678,7 @@
           <a:p>
             <a:fld id="{959034B2-E59A-43A2-8E80-CBA56A51A393}" type="datetimeFigureOut">
               <a:rPr lang="en-IE" smtClean="0"/>
-              <a:t>11/11/2025</a:t>
+              <a:t>13/11/2025</a:t>
             </a:fld>
             <a:endParaRPr lang="en-IE"/>
           </a:p>
@@ -877,7 +878,7 @@
           <a:p>
             <a:fld id="{959034B2-E59A-43A2-8E80-CBA56A51A393}" type="datetimeFigureOut">
               <a:rPr lang="en-IE" smtClean="0"/>
-              <a:t>11/11/2025</a:t>
+              <a:t>13/11/2025</a:t>
             </a:fld>
             <a:endParaRPr lang="en-IE"/>
           </a:p>
@@ -1153,7 +1154,7 @@
           <a:p>
             <a:fld id="{959034B2-E59A-43A2-8E80-CBA56A51A393}" type="datetimeFigureOut">
               <a:rPr lang="en-IE" smtClean="0"/>
-              <a:t>11/11/2025</a:t>
+              <a:t>13/11/2025</a:t>
             </a:fld>
             <a:endParaRPr lang="en-IE"/>
           </a:p>
@@ -1421,7 +1422,7 @@
           <a:p>
             <a:fld id="{959034B2-E59A-43A2-8E80-CBA56A51A393}" type="datetimeFigureOut">
               <a:rPr lang="en-IE" smtClean="0"/>
-              <a:t>11/11/2025</a:t>
+              <a:t>13/11/2025</a:t>
             </a:fld>
             <a:endParaRPr lang="en-IE"/>
           </a:p>
@@ -1836,7 +1837,7 @@
           <a:p>
             <a:fld id="{959034B2-E59A-43A2-8E80-CBA56A51A393}" type="datetimeFigureOut">
               <a:rPr lang="en-IE" smtClean="0"/>
-              <a:t>11/11/2025</a:t>
+              <a:t>13/11/2025</a:t>
             </a:fld>
             <a:endParaRPr lang="en-IE"/>
           </a:p>
@@ -1978,7 +1979,7 @@
           <a:p>
             <a:fld id="{959034B2-E59A-43A2-8E80-CBA56A51A393}" type="datetimeFigureOut">
               <a:rPr lang="en-IE" smtClean="0"/>
-              <a:t>11/11/2025</a:t>
+              <a:t>13/11/2025</a:t>
             </a:fld>
             <a:endParaRPr lang="en-IE"/>
           </a:p>
@@ -2091,7 +2092,7 @@
           <a:p>
             <a:fld id="{959034B2-E59A-43A2-8E80-CBA56A51A393}" type="datetimeFigureOut">
               <a:rPr lang="en-IE" smtClean="0"/>
-              <a:t>11/11/2025</a:t>
+              <a:t>13/11/2025</a:t>
             </a:fld>
             <a:endParaRPr lang="en-IE"/>
           </a:p>
@@ -2404,7 +2405,7 @@
           <a:p>
             <a:fld id="{959034B2-E59A-43A2-8E80-CBA56A51A393}" type="datetimeFigureOut">
               <a:rPr lang="en-IE" smtClean="0"/>
-              <a:t>11/11/2025</a:t>
+              <a:t>13/11/2025</a:t>
             </a:fld>
             <a:endParaRPr lang="en-IE"/>
           </a:p>
@@ -2693,7 +2694,7 @@
           <a:p>
             <a:fld id="{959034B2-E59A-43A2-8E80-CBA56A51A393}" type="datetimeFigureOut">
               <a:rPr lang="en-IE" smtClean="0"/>
-              <a:t>11/11/2025</a:t>
+              <a:t>13/11/2025</a:t>
             </a:fld>
             <a:endParaRPr lang="en-IE"/>
           </a:p>
@@ -2936,7 +2937,7 @@
           <a:p>
             <a:fld id="{959034B2-E59A-43A2-8E80-CBA56A51A393}" type="datetimeFigureOut">
               <a:rPr lang="en-IE" smtClean="0"/>
-              <a:t>11/11/2025</a:t>
+              <a:t>13/11/2025</a:t>
             </a:fld>
             <a:endParaRPr lang="en-IE"/>
           </a:p>
@@ -20129,8 +20130,8 @@
         </p:blipFill>
         <p:spPr>
           <a:xfrm>
-            <a:off x="1938336" y="5808785"/>
-            <a:ext cx="7982728" cy="2761492"/>
+            <a:off x="1938337" y="5808785"/>
+            <a:ext cx="7982725" cy="2761492"/>
           </a:xfrm>
           <a:prstGeom prst="rect">
             <a:avLst/>
@@ -20165,7 +20166,7 @@
         <p:spPr>
           <a:xfrm>
             <a:off x="1938337" y="285799"/>
-            <a:ext cx="7982726" cy="2761493"/>
+            <a:ext cx="7982726" cy="2761492"/>
           </a:xfrm>
           <a:prstGeom prst="rect">
             <a:avLst/>
@@ -20199,8 +20200,8 @@
         </p:blipFill>
         <p:spPr>
           <a:xfrm>
-            <a:off x="1938336" y="3047292"/>
-            <a:ext cx="7982728" cy="2761492"/>
+            <a:off x="1938337" y="3047292"/>
+            <a:ext cx="7982725" cy="2761492"/>
           </a:xfrm>
           <a:prstGeom prst="rect">
             <a:avLst/>
@@ -20376,6 +20377,133 @@
     <p:extLst>
       <p:ext uri="{BB962C8B-B14F-4D97-AF65-F5344CB8AC3E}">
         <p14:creationId xmlns:p14="http://schemas.microsoft.com/office/powerpoint/2010/main" val="1573356396"/>
+      </p:ext>
+    </p:extLst>
+  </p:cSld>
+  <p:clrMapOvr>
+    <a:masterClrMapping/>
+  </p:clrMapOvr>
+</p:sld>
+</file>
+
+<file path=ppt/slides/slide8.xml><?xml version="1.0" encoding="utf-8"?>
+<p:sld xmlns:a="http://schemas.openxmlformats.org/drawingml/2006/main" xmlns:r="http://schemas.openxmlformats.org/officeDocument/2006/relationships" xmlns:p="http://schemas.openxmlformats.org/presentationml/2006/main">
+  <p:cSld>
+    <p:spTree>
+      <p:nvGrpSpPr>
+        <p:cNvPr id="1" name=""/>
+        <p:cNvGrpSpPr/>
+        <p:nvPr/>
+      </p:nvGrpSpPr>
+      <p:grpSpPr>
+        <a:xfrm>
+          <a:off x="0" y="0"/>
+          <a:ext cx="0" cy="0"/>
+          <a:chOff x="0" y="0"/>
+          <a:chExt cx="0" cy="0"/>
+        </a:xfrm>
+      </p:grpSpPr>
+      <p:grpSp>
+        <p:nvGrpSpPr>
+          <p:cNvPr id="8" name="Group 7">
+            <a:extLst>
+              <a:ext uri="{FF2B5EF4-FFF2-40B4-BE49-F238E27FC236}">
+                <a16:creationId xmlns:a16="http://schemas.microsoft.com/office/drawing/2014/main" id="{4C0B57EC-BC45-8C62-3D40-111B5094977B}"/>
+              </a:ext>
+            </a:extLst>
+          </p:cNvPr>
+          <p:cNvGrpSpPr/>
+          <p:nvPr/>
+        </p:nvGrpSpPr>
+        <p:grpSpPr>
+          <a:xfrm>
+            <a:off x="-1437837" y="1425976"/>
+            <a:ext cx="15067674" cy="4006048"/>
+            <a:chOff x="78261" y="1215770"/>
+            <a:chExt cx="15067674" cy="4006048"/>
+          </a:xfrm>
+        </p:grpSpPr>
+        <p:pic>
+          <p:nvPicPr>
+            <p:cNvPr id="5" name="Picture 4">
+              <a:extLst>
+                <a:ext uri="{FF2B5EF4-FFF2-40B4-BE49-F238E27FC236}">
+                  <a16:creationId xmlns:a16="http://schemas.microsoft.com/office/drawing/2014/main" id="{E3264E6C-B1A7-B636-D729-20517FE86F28}"/>
+                </a:ext>
+              </a:extLst>
+            </p:cNvPr>
+            <p:cNvPicPr>
+              <a:picLocks noChangeAspect="1"/>
+            </p:cNvPicPr>
+            <p:nvPr/>
+          </p:nvPicPr>
+          <p:blipFill>
+            <a:blip r:embed="rId2"/>
+            <a:stretch>
+              <a:fillRect/>
+            </a:stretch>
+          </p:blipFill>
+          <p:spPr>
+            <a:xfrm>
+              <a:off x="78261" y="1215770"/>
+              <a:ext cx="7495010" cy="4006048"/>
+            </a:xfrm>
+            <a:prstGeom prst="rect">
+              <a:avLst/>
+            </a:prstGeom>
+            <a:ln>
+              <a:solidFill>
+                <a:schemeClr val="tx1">
+                  <a:lumMod val="95000"/>
+                  <a:lumOff val="5000"/>
+                </a:schemeClr>
+              </a:solidFill>
+            </a:ln>
+          </p:spPr>
+        </p:pic>
+        <p:pic>
+          <p:nvPicPr>
+            <p:cNvPr id="7" name="Picture 6">
+              <a:extLst>
+                <a:ext uri="{FF2B5EF4-FFF2-40B4-BE49-F238E27FC236}">
+                  <a16:creationId xmlns:a16="http://schemas.microsoft.com/office/drawing/2014/main" id="{C8DB8179-4F30-4509-B6BA-4592F6F46AE8}"/>
+                </a:ext>
+              </a:extLst>
+            </p:cNvPr>
+            <p:cNvPicPr>
+              <a:picLocks noChangeAspect="1"/>
+            </p:cNvPicPr>
+            <p:nvPr/>
+          </p:nvPicPr>
+          <p:blipFill>
+            <a:blip r:embed="rId3"/>
+            <a:stretch>
+              <a:fillRect/>
+            </a:stretch>
+          </p:blipFill>
+          <p:spPr>
+            <a:xfrm>
+              <a:off x="7863202" y="1215770"/>
+              <a:ext cx="7282733" cy="3967947"/>
+            </a:xfrm>
+            <a:prstGeom prst="rect">
+              <a:avLst/>
+            </a:prstGeom>
+            <a:ln>
+              <a:solidFill>
+                <a:schemeClr val="tx1">
+                  <a:lumMod val="95000"/>
+                  <a:lumOff val="5000"/>
+                </a:schemeClr>
+              </a:solidFill>
+            </a:ln>
+          </p:spPr>
+        </p:pic>
+      </p:grpSp>
+    </p:spTree>
+    <p:extLst>
+      <p:ext uri="{BB962C8B-B14F-4D97-AF65-F5344CB8AC3E}">
+        <p14:creationId xmlns:p14="http://schemas.microsoft.com/office/powerpoint/2010/main" val="3531710875"/>
       </p:ext>
     </p:extLst>
   </p:cSld>

</xml_diff>